<commit_message>
Added S1 files, added MLOPS folder containing cookiecutter structure
</commit_message>
<xml_diff>
--- a/s1_getting_started/lecture/course_intro.pptx
+++ b/s1_getting_started/lecture/course_intro.pptx
@@ -4097,7 +4097,7 @@
           <a:p>
             <a:r>
               <a:rPr lang="da-DK" dirty="0"/>
-              <a:t>02476 Machine Learning Operations</a:t>
+              <a:t>Machine Learning Operations</a:t>
             </a:r>
           </a:p>
           <a:p>
@@ -5382,7 +5382,7 @@
         </p:nvGrpSpPr>
         <p:grpSpPr>
           <a:xfrm>
-            <a:off x="8149420" y="3947282"/>
+            <a:off x="7581301" y="3528251"/>
             <a:ext cx="3273096" cy="2591630"/>
             <a:chOff x="3490565" y="2970737"/>
             <a:chExt cx="3273096" cy="2591630"/>

</xml_diff>